<commit_message>
Added page to Data Mining book in references
</commit_message>
<xml_diff>
--- a/presentation/Nonlinear_Sammon_Mapping.pptx
+++ b/presentation/Nonlinear_Sammon_Mapping.pptx
@@ -2840,7 +2840,15 @@
             </a:r>
             <a:r>
               <a:rPr lang="de-DE" dirty="0" smtClean="0"/>
-              <a:t>. 2. Auflage. Springer Vieweg. Berlin 2015.</a:t>
+              <a:t>, S. </a:t>
+            </a:r>
+            <a:r>
+              <a:rPr lang="de-DE" smtClean="0"/>
+              <a:t>47-51. </a:t>
+            </a:r>
+            <a:r>
+              <a:rPr lang="de-DE" dirty="0" smtClean="0"/>
+              <a:t>2. Auflage. Springer Vieweg. Berlin 2015.</a:t>
             </a:r>
             <a:endParaRPr lang="de-DE" dirty="0"/>
           </a:p>
@@ -4065,8 +4073,8 @@
           </a:p>
         </p:txBody>
       </p:sp>
-      <mc:AlternateContent xmlns:mc="http://schemas.openxmlformats.org/markup-compatibility/2006">
-        <mc:Choice xmlns:a14="http://schemas.microsoft.com/office/drawing/2010/main" Requires="a14">
+      <mc:AlternateContent xmlns:mc="http://schemas.openxmlformats.org/markup-compatibility/2006" xmlns:a14="http://schemas.microsoft.com/office/drawing/2010/main">
+        <mc:Choice Requires="a14">
           <p:sp>
             <p:nvSpPr>
               <p:cNvPr id="6" name="Textfeld 5"/>
@@ -4089,6 +4097,7 @@
               </a:bodyPr>
               <a:lstStyle/>
               <a:p>
+                <a:pPr/>
                 <a14:m>
                   <m:oMathPara xmlns:m="http://schemas.openxmlformats.org/officeDocument/2006/math">
                     <m:oMathParaPr>
@@ -4363,7 +4372,7 @@
             </p:txBody>
           </p:sp>
         </mc:Choice>
-        <mc:Fallback>
+        <mc:Fallback xmlns="">
           <p:sp>
             <p:nvSpPr>
               <p:cNvPr id="6" name="Textfeld 5"/>

</xml_diff>

<commit_message>
Added the idea of the Sammon algorithm to README.md
</commit_message>
<xml_diff>
--- a/presentation/Nonlinear_Sammon_Mapping.pptx
+++ b/presentation/Nonlinear_Sammon_Mapping.pptx
@@ -5,10 +5,10 @@
     <p:sldMasterId id="2147483663" r:id="rId1"/>
   </p:sldMasterIdLst>
   <p:notesMasterIdLst>
-    <p:notesMasterId r:id="rId13"/>
+    <p:notesMasterId r:id="rId14"/>
   </p:notesMasterIdLst>
   <p:handoutMasterIdLst>
-    <p:handoutMasterId r:id="rId14"/>
+    <p:handoutMasterId r:id="rId15"/>
   </p:handoutMasterIdLst>
   <p:sldIdLst>
     <p:sldId id="283" r:id="rId2"/>
@@ -18,10 +18,11 @@
     <p:sldId id="288" r:id="rId6"/>
     <p:sldId id="286" r:id="rId7"/>
     <p:sldId id="287" r:id="rId8"/>
-    <p:sldId id="292" r:id="rId9"/>
-    <p:sldId id="293" r:id="rId10"/>
-    <p:sldId id="291" r:id="rId11"/>
-    <p:sldId id="290" r:id="rId12"/>
+    <p:sldId id="294" r:id="rId9"/>
+    <p:sldId id="292" r:id="rId10"/>
+    <p:sldId id="293" r:id="rId11"/>
+    <p:sldId id="291" r:id="rId12"/>
+    <p:sldId id="290" r:id="rId13"/>
   </p:sldIdLst>
   <p:sldSz cx="9144000" cy="6858000" type="screen4x3"/>
   <p:notesSz cx="6400800" cy="8686800"/>
@@ -2701,6 +2702,149 @@
           <a:p>
             <a:r>
               <a:rPr lang="de-DE" dirty="0" smtClean="0"/>
+              <a:t>Anwendung an Beispielen</a:t>
+            </a:r>
+            <a:endParaRPr lang="de-DE" dirty="0"/>
+          </a:p>
+        </p:txBody>
+      </p:sp>
+      <p:sp>
+        <p:nvSpPr>
+          <p:cNvPr id="3" name="Inhaltsplatzhalter 2"/>
+          <p:cNvSpPr>
+            <a:spLocks noGrp="1"/>
+          </p:cNvSpPr>
+          <p:nvPr>
+            <p:ph idx="1"/>
+          </p:nvPr>
+        </p:nvSpPr>
+        <p:spPr/>
+        <p:txBody>
+          <a:bodyPr/>
+          <a:lstStyle/>
+          <a:p>
+            <a:r>
+              <a:rPr lang="de-DE" dirty="0" smtClean="0"/>
+              <a:t>Screenshots von </a:t>
+            </a:r>
+            <a:r>
+              <a:rPr lang="de-DE" dirty="0" err="1" smtClean="0"/>
+              <a:t>HiSee</a:t>
+            </a:r>
+            <a:r>
+              <a:rPr lang="de-DE" dirty="0" smtClean="0"/>
+              <a:t> (ggf. Verlauf anzeigen)</a:t>
+            </a:r>
+          </a:p>
+          <a:p>
+            <a:endParaRPr lang="de-DE" dirty="0"/>
+          </a:p>
+          <a:p>
+            <a:r>
+              <a:rPr lang="de-DE" dirty="0" smtClean="0"/>
+              <a:t>Abbildungen aus dem Data Mining Buch und den Online-Quellen</a:t>
+            </a:r>
+          </a:p>
+        </p:txBody>
+      </p:sp>
+      <p:sp>
+        <p:nvSpPr>
+          <p:cNvPr id="4" name="Fußzeilenplatzhalter 3"/>
+          <p:cNvSpPr>
+            <a:spLocks noGrp="1"/>
+          </p:cNvSpPr>
+          <p:nvPr>
+            <p:ph type="ftr" sz="quarter" idx="11"/>
+          </p:nvPr>
+        </p:nvSpPr>
+        <p:spPr/>
+        <p:txBody>
+          <a:bodyPr/>
+          <a:lstStyle/>
+          <a:p>
+            <a:r>
+              <a:rPr lang="de-DE" smtClean="0"/>
+              <a:t>Nichtlineare Projektion mit dem Sammon-Verfahren // Data Mining Prozess, Statistik // 16.03.2018</a:t>
+            </a:r>
+            <a:endParaRPr lang="de-DE"/>
+          </a:p>
+        </p:txBody>
+      </p:sp>
+      <p:sp>
+        <p:nvSpPr>
+          <p:cNvPr id="5" name="Foliennummernplatzhalter 4"/>
+          <p:cNvSpPr>
+            <a:spLocks noGrp="1"/>
+          </p:cNvSpPr>
+          <p:nvPr>
+            <p:ph type="sldNum" sz="quarter" idx="4"/>
+          </p:nvPr>
+        </p:nvSpPr>
+        <p:spPr/>
+        <p:txBody>
+          <a:bodyPr/>
+          <a:lstStyle/>
+          <a:p>
+            <a:r>
+              <a:rPr lang="de-DE" smtClean="0"/>
+              <a:t>Seite  </a:t>
+            </a:r>
+            <a:fld id="{94138CF8-D13E-442C-B3EC-81E94F2A8F31}" type="slidenum">
+              <a:rPr lang="de-DE" smtClean="0"/>
+              <a:pPr/>
+              <a:t>10</a:t>
+            </a:fld>
+            <a:endParaRPr lang="de-DE" dirty="0"/>
+          </a:p>
+        </p:txBody>
+      </p:sp>
+    </p:spTree>
+    <p:extLst>
+      <p:ext uri="{BB962C8B-B14F-4D97-AF65-F5344CB8AC3E}">
+        <p14:creationId xmlns:p14="http://schemas.microsoft.com/office/powerpoint/2010/main" val="1678938992"/>
+      </p:ext>
+    </p:extLst>
+  </p:cSld>
+  <p:clrMapOvr>
+    <a:masterClrMapping/>
+  </p:clrMapOvr>
+</p:sld>
+</file>
+
+<file path=ppt/slides/slide11.xml><?xml version="1.0" encoding="utf-8"?>
+<p:sld xmlns:a="http://schemas.openxmlformats.org/drawingml/2006/main" xmlns:r="http://schemas.openxmlformats.org/officeDocument/2006/relationships" xmlns:p="http://schemas.openxmlformats.org/presentationml/2006/main">
+  <p:cSld>
+    <p:spTree>
+      <p:nvGrpSpPr>
+        <p:cNvPr id="1" name=""/>
+        <p:cNvGrpSpPr/>
+        <p:nvPr/>
+      </p:nvGrpSpPr>
+      <p:grpSpPr>
+        <a:xfrm>
+          <a:off x="0" y="0"/>
+          <a:ext cx="0" cy="0"/>
+          <a:chOff x="0" y="0"/>
+          <a:chExt cx="0" cy="0"/>
+        </a:xfrm>
+      </p:grpSpPr>
+      <p:sp>
+        <p:nvSpPr>
+          <p:cNvPr id="2" name="Titel 1"/>
+          <p:cNvSpPr>
+            <a:spLocks noGrp="1"/>
+          </p:cNvSpPr>
+          <p:nvPr>
+            <p:ph type="title"/>
+          </p:nvPr>
+        </p:nvSpPr>
+        <p:spPr/>
+        <p:txBody>
+          <a:bodyPr/>
+          <a:lstStyle/>
+          <a:p>
+            <a:r>
+              <a:rPr lang="de-DE" dirty="0" smtClean="0"/>
               <a:t>Literatur</a:t>
             </a:r>
             <a:endParaRPr lang="de-DE" dirty="0"/>
@@ -2840,11 +2984,7 @@
             </a:r>
             <a:r>
               <a:rPr lang="de-DE" dirty="0" smtClean="0"/>
-              <a:t>, S. </a:t>
-            </a:r>
-            <a:r>
-              <a:rPr lang="de-DE" smtClean="0"/>
-              <a:t>47-51. </a:t>
+              <a:t>, S. 47-51. </a:t>
             </a:r>
             <a:r>
               <a:rPr lang="de-DE" dirty="0" smtClean="0"/>
@@ -3195,7 +3335,7 @@
             <a:fld id="{94138CF8-D13E-442C-B3EC-81E94F2A8F31}" type="slidenum">
               <a:rPr lang="de-DE" smtClean="0"/>
               <a:pPr/>
-              <a:t>10</a:t>
+              <a:t>11</a:t>
             </a:fld>
             <a:endParaRPr lang="de-DE" dirty="0"/>
           </a:p>
@@ -3214,7 +3354,7 @@
 </p:sld>
 </file>
 
-<file path=ppt/slides/slide11.xml><?xml version="1.0" encoding="utf-8"?>
+<file path=ppt/slides/slide12.xml><?xml version="1.0" encoding="utf-8"?>
 <p:sld xmlns:a="http://schemas.openxmlformats.org/drawingml/2006/main" xmlns:r="http://schemas.openxmlformats.org/officeDocument/2006/relationships" xmlns:p="http://schemas.openxmlformats.org/presentationml/2006/main">
   <p:cSld>
     <p:spTree>
@@ -3756,12 +3896,13 @@
             <a:pPr marL="827075" lvl="2" indent="-285750" defTabSz="914400"/>
             <a:r>
               <a:rPr lang="de-DE" dirty="0" smtClean="0"/>
-              <a:t>Abbildung der Relationen zwischen Objekten</a:t>
-            </a:r>
-          </a:p>
-          <a:p>
-            <a:pPr marL="827075" lvl="2" indent="-285750" defTabSz="914400"/>
-            <a:endParaRPr lang="de-DE" dirty="0"/>
+              <a:t>Abbildung der Relationen zwischen </a:t>
+            </a:r>
+            <a:r>
+              <a:rPr lang="de-DE" dirty="0" smtClean="0"/>
+              <a:t>Objekten</a:t>
+            </a:r>
+            <a:endParaRPr lang="de-DE" dirty="0" smtClean="0"/>
           </a:p>
         </p:txBody>
       </p:sp>
@@ -4593,7 +4734,7 @@
           <a:p>
             <a:r>
               <a:rPr lang="de-DE" dirty="0" smtClean="0"/>
-              <a:t>Anwendung an Beispielen</a:t>
+              <a:t>Einordnung in den statistischen Kontext</a:t>
             </a:r>
             <a:endParaRPr lang="de-DE" dirty="0"/>
           </a:p>
@@ -4601,7 +4742,47 @@
       </p:sp>
       <p:sp>
         <p:nvSpPr>
-          <p:cNvPr id="3" name="Fußzeilenplatzhalter 2"/>
+          <p:cNvPr id="3" name="Inhaltsplatzhalter 2"/>
+          <p:cNvSpPr>
+            <a:spLocks noGrp="1"/>
+          </p:cNvSpPr>
+          <p:nvPr>
+            <p:ph idx="1"/>
+          </p:nvPr>
+        </p:nvSpPr>
+        <p:spPr/>
+        <p:txBody>
+          <a:bodyPr/>
+          <a:lstStyle/>
+          <a:p>
+            <a:pPr marL="647692" lvl="1" indent="-285750" defTabSz="914400"/>
+            <a:r>
+              <a:rPr lang="de-DE" dirty="0"/>
+              <a:t>(Weiterverarbeitung der Projektion mit anderen statistischen Methoden)</a:t>
+            </a:r>
+          </a:p>
+          <a:p>
+            <a:pPr marL="827075" lvl="2" indent="-285750" defTabSz="914400"/>
+            <a:r>
+              <a:rPr lang="de-DE" dirty="0"/>
+              <a:t>Korrelation</a:t>
+            </a:r>
+          </a:p>
+          <a:p>
+            <a:pPr marL="827075" lvl="2" indent="-285750" defTabSz="914400"/>
+            <a:r>
+              <a:rPr lang="de-DE" dirty="0"/>
+              <a:t>Regression</a:t>
+            </a:r>
+          </a:p>
+          <a:p>
+            <a:endParaRPr lang="de-DE" dirty="0"/>
+          </a:p>
+        </p:txBody>
+      </p:sp>
+      <p:sp>
+        <p:nvSpPr>
+          <p:cNvPr id="4" name="Fußzeilenplatzhalter 3"/>
           <p:cNvSpPr>
             <a:spLocks noGrp="1"/>
           </p:cNvSpPr>
@@ -4618,21 +4799,9 @@
               <a:rPr lang="de-DE" smtClean="0"/>
               <a:t>Nichtlineare Projektion mit dem Sammon-Verfahren // Data Mining Prozess, Statistik // 16.03.2018</a:t>
             </a:r>
-            <a:endParaRPr lang="de-DE" dirty="0"/>
-          </a:p>
-        </p:txBody>
-      </p:sp>
-      <p:sp>
-        <p:nvSpPr>
-          <p:cNvPr id="4" name="Bildplatzhalter 3"/>
-          <p:cNvSpPr>
-            <a:spLocks noGrp="1"/>
-          </p:cNvSpPr>
-          <p:nvPr>
-            <p:ph type="pic" sz="quarter" idx="13"/>
-          </p:nvPr>
-        </p:nvSpPr>
-        <p:spPr/>
+            <a:endParaRPr lang="de-DE"/>
+          </a:p>
+        </p:txBody>
       </p:sp>
       <p:sp>
         <p:nvSpPr>
@@ -4665,7 +4834,7 @@
     </p:spTree>
     <p:extLst>
       <p:ext uri="{BB962C8B-B14F-4D97-AF65-F5344CB8AC3E}">
-        <p14:creationId xmlns:p14="http://schemas.microsoft.com/office/powerpoint/2010/main" val="1735359814"/>
+        <p14:creationId xmlns:p14="http://schemas.microsoft.com/office/powerpoint/2010/main" val="1313153529"/>
       </p:ext>
     </p:extLst>
   </p:cSld>
@@ -4717,46 +4886,7 @@
       </p:sp>
       <p:sp>
         <p:nvSpPr>
-          <p:cNvPr id="3" name="Inhaltsplatzhalter 2"/>
-          <p:cNvSpPr>
-            <a:spLocks noGrp="1"/>
-          </p:cNvSpPr>
-          <p:nvPr>
-            <p:ph idx="1"/>
-          </p:nvPr>
-        </p:nvSpPr>
-        <p:spPr/>
-        <p:txBody>
-          <a:bodyPr/>
-          <a:lstStyle/>
-          <a:p>
-            <a:r>
-              <a:rPr lang="de-DE" dirty="0" smtClean="0"/>
-              <a:t>Screenshots von </a:t>
-            </a:r>
-            <a:r>
-              <a:rPr lang="de-DE" dirty="0" err="1" smtClean="0"/>
-              <a:t>HiSee</a:t>
-            </a:r>
-            <a:r>
-              <a:rPr lang="de-DE" dirty="0" smtClean="0"/>
-              <a:t> (ggf. Verlauf anzeigen)</a:t>
-            </a:r>
-          </a:p>
-          <a:p>
-            <a:endParaRPr lang="de-DE" dirty="0"/>
-          </a:p>
-          <a:p>
-            <a:r>
-              <a:rPr lang="de-DE" dirty="0" smtClean="0"/>
-              <a:t>Abbildungen aus dem Data Mining Buch und den Online-Quellen</a:t>
-            </a:r>
-          </a:p>
-        </p:txBody>
-      </p:sp>
-      <p:sp>
-        <p:nvSpPr>
-          <p:cNvPr id="4" name="Fußzeilenplatzhalter 3"/>
+          <p:cNvPr id="3" name="Fußzeilenplatzhalter 2"/>
           <p:cNvSpPr>
             <a:spLocks noGrp="1"/>
           </p:cNvSpPr>
@@ -4773,7 +4903,7 @@
               <a:rPr lang="de-DE" smtClean="0"/>
               <a:t>Nichtlineare Projektion mit dem Sammon-Verfahren // Data Mining Prozess, Statistik // 16.03.2018</a:t>
             </a:r>
-            <a:endParaRPr lang="de-DE"/>
+            <a:endParaRPr lang="de-DE" dirty="0"/>
           </a:p>
         </p:txBody>
       </p:sp>
@@ -4805,10 +4935,41 @@
           </a:p>
         </p:txBody>
       </p:sp>
+      <p:pic>
+        <p:nvPicPr>
+          <p:cNvPr id="7" name="Bildplatzhalter 6"/>
+          <p:cNvPicPr>
+            <a:picLocks noChangeAspect="1"/>
+          </p:cNvPicPr>
+          <p:nvPr/>
+        </p:nvPicPr>
+        <p:blipFill>
+          <a:blip r:embed="rId2" cstate="print">
+            <a:extLst>
+              <a:ext uri="{28A0092B-C50C-407E-A947-70E740481C1C}">
+                <a14:useLocalDpi xmlns:a14="http://schemas.microsoft.com/office/drawing/2010/main" val="0"/>
+              </a:ext>
+            </a:extLst>
+          </a:blip>
+          <a:srcRect l="93" r="93"/>
+          <a:stretch>
+            <a:fillRect/>
+          </a:stretch>
+        </p:blipFill>
+        <p:spPr>
+          <a:xfrm>
+            <a:off x="0" y="439224"/>
+            <a:ext cx="9144000" cy="4076473"/>
+          </a:xfrm>
+          <a:prstGeom prst="rect">
+            <a:avLst/>
+          </a:prstGeom>
+        </p:spPr>
+      </p:pic>
     </p:spTree>
     <p:extLst>
       <p:ext uri="{BB962C8B-B14F-4D97-AF65-F5344CB8AC3E}">
-        <p14:creationId xmlns:p14="http://schemas.microsoft.com/office/powerpoint/2010/main" val="1678938992"/>
+        <p14:creationId xmlns:p14="http://schemas.microsoft.com/office/powerpoint/2010/main" val="1735359814"/>
       </p:ext>
     </p:extLst>
   </p:cSld>

</xml_diff>